<commit_message>
remove dangling last page from ppt
</commit_message>
<xml_diff>
--- a/slides/Programming Principles Practices C++ - Desktop calculator.pptx
+++ b/slides/Programming Principles Practices C++ - Desktop calculator.pptx
@@ -5,7 +5,7 @@
     <p:sldMasterId id="2147483648" r:id="rId1"/>
   </p:sldMasterIdLst>
   <p:notesMasterIdLst>
-    <p:notesMasterId r:id="rId38"/>
+    <p:notesMasterId r:id="rId37"/>
   </p:notesMasterIdLst>
   <p:sldIdLst>
     <p:sldId id="257" r:id="rId2"/>
@@ -43,7 +43,6 @@
     <p:sldId id="295" r:id="rId34"/>
     <p:sldId id="284" r:id="rId35"/>
     <p:sldId id="281" r:id="rId36"/>
-    <p:sldId id="296" r:id="rId37"/>
   </p:sldIdLst>
   <p:sldSz cx="9144000" cy="6858000" type="screen4x3"/>
   <p:notesSz cx="6858000" cy="9144000"/>
@@ -228,7 +227,7 @@
             <a:fld id="{8879E521-41E3-4B66-9BDE-6453190F86E3}" type="datetimeFigureOut">
               <a:rPr lang="ko-KR" altLang="en-US" smtClean="0"/>
               <a:pPr/>
-              <a:t>2012-06-28</a:t>
+              <a:t>2012-06-29</a:t>
             </a:fld>
             <a:endParaRPr lang="ko-KR" altLang="en-US"/>
           </a:p>
@@ -2640,7 +2639,7 @@
             <a:fld id="{3D8541EB-D013-4D9B-A735-5B7715178086}" type="datetimeFigureOut">
               <a:rPr lang="ko-KR" altLang="en-US" smtClean="0"/>
               <a:pPr/>
-              <a:t>2012-06-28</a:t>
+              <a:t>2012-06-29</a:t>
             </a:fld>
             <a:endParaRPr lang="ko-KR" altLang="en-US"/>
           </a:p>
@@ -2807,7 +2806,7 @@
             <a:fld id="{3D8541EB-D013-4D9B-A735-5B7715178086}" type="datetimeFigureOut">
               <a:rPr lang="ko-KR" altLang="en-US" smtClean="0"/>
               <a:pPr/>
-              <a:t>2012-06-28</a:t>
+              <a:t>2012-06-29</a:t>
             </a:fld>
             <a:endParaRPr lang="ko-KR" altLang="en-US"/>
           </a:p>
@@ -2984,7 +2983,7 @@
             <a:fld id="{3D8541EB-D013-4D9B-A735-5B7715178086}" type="datetimeFigureOut">
               <a:rPr lang="ko-KR" altLang="en-US" smtClean="0"/>
               <a:pPr/>
-              <a:t>2012-06-28</a:t>
+              <a:t>2012-06-29</a:t>
             </a:fld>
             <a:endParaRPr lang="ko-KR" altLang="en-US"/>
           </a:p>
@@ -3151,7 +3150,7 @@
             <a:fld id="{3D8541EB-D013-4D9B-A735-5B7715178086}" type="datetimeFigureOut">
               <a:rPr lang="ko-KR" altLang="en-US" smtClean="0"/>
               <a:pPr/>
-              <a:t>2012-06-28</a:t>
+              <a:t>2012-06-29</a:t>
             </a:fld>
             <a:endParaRPr lang="ko-KR" altLang="en-US"/>
           </a:p>
@@ -3394,7 +3393,7 @@
             <a:fld id="{3D8541EB-D013-4D9B-A735-5B7715178086}" type="datetimeFigureOut">
               <a:rPr lang="ko-KR" altLang="en-US" smtClean="0"/>
               <a:pPr/>
-              <a:t>2012-06-28</a:t>
+              <a:t>2012-06-29</a:t>
             </a:fld>
             <a:endParaRPr lang="ko-KR" altLang="en-US"/>
           </a:p>
@@ -3679,7 +3678,7 @@
             <a:fld id="{3D8541EB-D013-4D9B-A735-5B7715178086}" type="datetimeFigureOut">
               <a:rPr lang="ko-KR" altLang="en-US" smtClean="0"/>
               <a:pPr/>
-              <a:t>2012-06-28</a:t>
+              <a:t>2012-06-29</a:t>
             </a:fld>
             <a:endParaRPr lang="ko-KR" altLang="en-US"/>
           </a:p>
@@ -4098,7 +4097,7 @@
             <a:fld id="{3D8541EB-D013-4D9B-A735-5B7715178086}" type="datetimeFigureOut">
               <a:rPr lang="ko-KR" altLang="en-US" smtClean="0"/>
               <a:pPr/>
-              <a:t>2012-06-28</a:t>
+              <a:t>2012-06-29</a:t>
             </a:fld>
             <a:endParaRPr lang="ko-KR" altLang="en-US"/>
           </a:p>
@@ -4213,7 +4212,7 @@
             <a:fld id="{3D8541EB-D013-4D9B-A735-5B7715178086}" type="datetimeFigureOut">
               <a:rPr lang="ko-KR" altLang="en-US" smtClean="0"/>
               <a:pPr/>
-              <a:t>2012-06-28</a:t>
+              <a:t>2012-06-29</a:t>
             </a:fld>
             <a:endParaRPr lang="ko-KR" altLang="en-US"/>
           </a:p>
@@ -4305,7 +4304,7 @@
             <a:fld id="{3D8541EB-D013-4D9B-A735-5B7715178086}" type="datetimeFigureOut">
               <a:rPr lang="ko-KR" altLang="en-US" smtClean="0"/>
               <a:pPr/>
-              <a:t>2012-06-28</a:t>
+              <a:t>2012-06-29</a:t>
             </a:fld>
             <a:endParaRPr lang="ko-KR" altLang="en-US"/>
           </a:p>
@@ -4579,7 +4578,7 @@
             <a:fld id="{3D8541EB-D013-4D9B-A735-5B7715178086}" type="datetimeFigureOut">
               <a:rPr lang="ko-KR" altLang="en-US" smtClean="0"/>
               <a:pPr/>
-              <a:t>2012-06-28</a:t>
+              <a:t>2012-06-29</a:t>
             </a:fld>
             <a:endParaRPr lang="ko-KR" altLang="en-US"/>
           </a:p>
@@ -4829,7 +4828,7 @@
             <a:fld id="{3D8541EB-D013-4D9B-A735-5B7715178086}" type="datetimeFigureOut">
               <a:rPr lang="ko-KR" altLang="en-US" smtClean="0"/>
               <a:pPr/>
-              <a:t>2012-06-28</a:t>
+              <a:t>2012-06-29</a:t>
             </a:fld>
             <a:endParaRPr lang="ko-KR" altLang="en-US"/>
           </a:p>
@@ -5039,7 +5038,7 @@
             <a:fld id="{3D8541EB-D013-4D9B-A735-5B7715178086}" type="datetimeFigureOut">
               <a:rPr lang="ko-KR" altLang="en-US" smtClean="0"/>
               <a:pPr/>
-              <a:t>2012-06-28</a:t>
+              <a:t>2012-06-29</a:t>
             </a:fld>
             <a:endParaRPr lang="ko-KR" altLang="en-US"/>
           </a:p>
@@ -11274,7 +11273,6 @@
               <a:rPr lang="en-US" altLang="ko-KR" dirty="0" smtClean="0"/>
               <a:t>Alternative </a:t>
             </a:r>
-            <a:endParaRPr lang="en-US" altLang="ko-KR" dirty="0" smtClean="0"/>
           </a:p>
           <a:p>
             <a:pPr lvl="2"/>
@@ -11311,7 +11309,6 @@
               <a:rPr lang="en-US" altLang="ko-KR" b="1" dirty="0" smtClean="0"/>
               <a:t>+ (one or more)</a:t>
             </a:r>
-            <a:endParaRPr lang="en-US" altLang="ko-KR" b="1" dirty="0" smtClean="0"/>
           </a:p>
           <a:p>
             <a:endParaRPr lang="ko-KR" altLang="en-US" dirty="0"/>
@@ -11866,14 +11863,7 @@
                 <a:latin typeface="Consolas" pitchFamily="49" charset="0"/>
                 <a:cs typeface="Consolas" pitchFamily="49" charset="0"/>
               </a:rPr>
-              <a:t>수치 및 괄호 </a:t>
-            </a:r>
-            <a:r>
-              <a:rPr lang="ko-KR" altLang="en-US" dirty="0" smtClean="0">
-                <a:latin typeface="Consolas" pitchFamily="49" charset="0"/>
-                <a:cs typeface="Consolas" pitchFamily="49" charset="0"/>
-              </a:rPr>
-              <a:t>처리</a:t>
+              <a:t>수치 및 괄호 처리</a:t>
             </a:r>
             <a:endParaRPr lang="en-US" altLang="ko-KR" dirty="0" smtClean="0">
               <a:latin typeface="Consolas" pitchFamily="49" charset="0"/>
@@ -12041,7 +12031,6 @@
               <a:rPr lang="en-US" altLang="ko-KR" dirty="0" smtClean="0"/>
               <a:t>.</a:t>
             </a:r>
-            <a:endParaRPr lang="en-US" altLang="ko-KR" dirty="0" smtClean="0"/>
           </a:p>
         </p:txBody>
       </p:sp>
@@ -12875,11 +12864,7 @@
           <a:p>
             <a:r>
               <a:rPr lang="ko-KR" altLang="en-US" dirty="0" smtClean="0"/>
-              <a:t>계산</a:t>
-            </a:r>
-            <a:r>
-              <a:rPr lang="ko-KR" altLang="en-US" dirty="0" smtClean="0"/>
-              <a:t>기</a:t>
+              <a:t>계산기</a:t>
             </a:r>
             <a:endParaRPr lang="ko-KR" altLang="en-US" dirty="0"/>
           </a:p>
@@ -15139,10 +15124,6 @@
               </a:rPr>
               <a:t>() </a:t>
             </a:r>
-            <a:endParaRPr lang="en-US" altLang="ko-KR" sz="1600" dirty="0" smtClean="0">
-              <a:latin typeface="Consolas" pitchFamily="49" charset="0"/>
-              <a:cs typeface="Consolas" pitchFamily="49" charset="0"/>
-            </a:endParaRPr>
           </a:p>
           <a:p>
             <a:pPr>
@@ -15181,10 +15162,6 @@
               </a:rPr>
               <a:t>();</a:t>
             </a:r>
-            <a:endParaRPr lang="en-US" altLang="ko-KR" sz="1600" dirty="0" smtClean="0">
-              <a:latin typeface="Consolas" pitchFamily="49" charset="0"/>
-              <a:cs typeface="Consolas" pitchFamily="49" charset="0"/>
-            </a:endParaRPr>
           </a:p>
           <a:p>
             <a:pPr>
@@ -15265,37 +15242,95 @@
                 <a:latin typeface="Consolas" pitchFamily="49" charset="0"/>
                 <a:cs typeface="Consolas" pitchFamily="49" charset="0"/>
               </a:rPr>
-              <a:t>    case </a:t>
-            </a:r>
+              <a:t>    case ‘*’: </a:t>
+            </a:r>
+          </a:p>
+          <a:p>
+            <a:pPr>
+              <a:buNone/>
+            </a:pPr>
             <a:r>
               <a:rPr lang="en-US" altLang="ko-KR" sz="1600" dirty="0" smtClean="0">
                 <a:latin typeface="Consolas" pitchFamily="49" charset="0"/>
                 <a:cs typeface="Consolas" pitchFamily="49" charset="0"/>
               </a:rPr>
-              <a:t>‘*’: </a:t>
-            </a:r>
-            <a:endParaRPr lang="en-US" altLang="ko-KR" sz="1600" dirty="0" smtClean="0">
-              <a:latin typeface="Consolas" pitchFamily="49" charset="0"/>
-              <a:cs typeface="Consolas" pitchFamily="49" charset="0"/>
-            </a:endParaRPr>
-          </a:p>
-          <a:p>
-            <a:pPr>
-              <a:buNone/>
-            </a:pPr>
+              <a:t>      left *= </a:t>
+            </a:r>
+            <a:r>
+              <a:rPr lang="en-US" altLang="ko-KR" sz="1600" b="1" dirty="0" smtClean="0">
+                <a:latin typeface="Consolas" pitchFamily="49" charset="0"/>
+                <a:cs typeface="Consolas" pitchFamily="49" charset="0"/>
+              </a:rPr>
+              <a:t>primary</a:t>
+            </a:r>
             <a:r>
               <a:rPr lang="en-US" altLang="ko-KR" sz="1600" dirty="0" smtClean="0">
                 <a:latin typeface="Consolas" pitchFamily="49" charset="0"/>
                 <a:cs typeface="Consolas" pitchFamily="49" charset="0"/>
               </a:rPr>
-              <a:t>      left </a:t>
-            </a:r>
+              <a:t>();</a:t>
+            </a:r>
+          </a:p>
+          <a:p>
+            <a:pPr>
+              <a:buNone/>
+            </a:pPr>
             <a:r>
               <a:rPr lang="en-US" altLang="ko-KR" sz="1600" dirty="0" smtClean="0">
                 <a:latin typeface="Consolas" pitchFamily="49" charset="0"/>
                 <a:cs typeface="Consolas" pitchFamily="49" charset="0"/>
               </a:rPr>
-              <a:t>*= </a:t>
+              <a:t>      t = </a:t>
+            </a:r>
+            <a:r>
+              <a:rPr lang="en-US" altLang="ko-KR" sz="1600" b="1" dirty="0" err="1" smtClean="0">
+                <a:latin typeface="Consolas" pitchFamily="49" charset="0"/>
+                <a:cs typeface="Consolas" pitchFamily="49" charset="0"/>
+              </a:rPr>
+              <a:t>ts.get</a:t>
+            </a:r>
+            <a:r>
+              <a:rPr lang="en-US" altLang="ko-KR" sz="1600" dirty="0" smtClean="0">
+                <a:latin typeface="Consolas" pitchFamily="49" charset="0"/>
+                <a:cs typeface="Consolas" pitchFamily="49" charset="0"/>
+              </a:rPr>
+              <a:t>();</a:t>
+            </a:r>
+          </a:p>
+          <a:p>
+            <a:pPr>
+              <a:buNone/>
+            </a:pPr>
+            <a:r>
+              <a:rPr lang="en-US" altLang="ko-KR" sz="1600" dirty="0" smtClean="0">
+                <a:latin typeface="Consolas" pitchFamily="49" charset="0"/>
+                <a:cs typeface="Consolas" pitchFamily="49" charset="0"/>
+              </a:rPr>
+              <a:t>      break;</a:t>
+            </a:r>
+          </a:p>
+          <a:p>
+            <a:pPr>
+              <a:buNone/>
+            </a:pPr>
+            <a:r>
+              <a:rPr lang="en-US" altLang="ko-KR" sz="1600" dirty="0" smtClean="0">
+                <a:latin typeface="Consolas" pitchFamily="49" charset="0"/>
+                <a:cs typeface="Consolas" pitchFamily="49" charset="0"/>
+              </a:rPr>
+              <a:t>    case ‘/’:</a:t>
+            </a:r>
+          </a:p>
+          <a:p>
+            <a:pPr>
+              <a:buNone/>
+            </a:pPr>
+            <a:r>
+              <a:rPr lang="en-US" altLang="ko-KR" sz="1600" dirty="0" smtClean="0">
+                <a:latin typeface="Consolas" pitchFamily="49" charset="0"/>
+                <a:cs typeface="Consolas" pitchFamily="49" charset="0"/>
+              </a:rPr>
+              <a:t>      left /= </a:t>
             </a:r>
             <a:r>
               <a:rPr lang="en-US" altLang="ko-KR" sz="1600" b="1" dirty="0" smtClean="0">
@@ -15311,108 +15346,6 @@
               </a:rPr>
               <a:t>();</a:t>
             </a:r>
-            <a:endParaRPr lang="en-US" altLang="ko-KR" sz="1600" dirty="0" smtClean="0">
-              <a:latin typeface="Consolas" pitchFamily="49" charset="0"/>
-              <a:cs typeface="Consolas" pitchFamily="49" charset="0"/>
-            </a:endParaRPr>
-          </a:p>
-          <a:p>
-            <a:pPr>
-              <a:buNone/>
-            </a:pPr>
-            <a:r>
-              <a:rPr lang="en-US" altLang="ko-KR" sz="1600" dirty="0" smtClean="0">
-                <a:latin typeface="Consolas" pitchFamily="49" charset="0"/>
-                <a:cs typeface="Consolas" pitchFamily="49" charset="0"/>
-              </a:rPr>
-              <a:t>      t = </a:t>
-            </a:r>
-            <a:r>
-              <a:rPr lang="en-US" altLang="ko-KR" sz="1600" b="1" dirty="0" err="1" smtClean="0">
-                <a:latin typeface="Consolas" pitchFamily="49" charset="0"/>
-                <a:cs typeface="Consolas" pitchFamily="49" charset="0"/>
-              </a:rPr>
-              <a:t>ts.get</a:t>
-            </a:r>
-            <a:r>
-              <a:rPr lang="en-US" altLang="ko-KR" sz="1600" dirty="0" smtClean="0">
-                <a:latin typeface="Consolas" pitchFamily="49" charset="0"/>
-                <a:cs typeface="Consolas" pitchFamily="49" charset="0"/>
-              </a:rPr>
-              <a:t>();</a:t>
-            </a:r>
-          </a:p>
-          <a:p>
-            <a:pPr>
-              <a:buNone/>
-            </a:pPr>
-            <a:r>
-              <a:rPr lang="en-US" altLang="ko-KR" sz="1600" dirty="0" smtClean="0">
-                <a:latin typeface="Consolas" pitchFamily="49" charset="0"/>
-                <a:cs typeface="Consolas" pitchFamily="49" charset="0"/>
-              </a:rPr>
-              <a:t>      break;</a:t>
-            </a:r>
-          </a:p>
-          <a:p>
-            <a:pPr>
-              <a:buNone/>
-            </a:pPr>
-            <a:r>
-              <a:rPr lang="en-US" altLang="ko-KR" sz="1600" dirty="0" smtClean="0">
-                <a:latin typeface="Consolas" pitchFamily="49" charset="0"/>
-                <a:cs typeface="Consolas" pitchFamily="49" charset="0"/>
-              </a:rPr>
-              <a:t>    case </a:t>
-            </a:r>
-            <a:r>
-              <a:rPr lang="en-US" altLang="ko-KR" sz="1600" dirty="0" smtClean="0">
-                <a:latin typeface="Consolas" pitchFamily="49" charset="0"/>
-                <a:cs typeface="Consolas" pitchFamily="49" charset="0"/>
-              </a:rPr>
-              <a:t>‘/’:</a:t>
-            </a:r>
-            <a:endParaRPr lang="en-US" altLang="ko-KR" sz="1600" dirty="0" smtClean="0">
-              <a:latin typeface="Consolas" pitchFamily="49" charset="0"/>
-              <a:cs typeface="Consolas" pitchFamily="49" charset="0"/>
-            </a:endParaRPr>
-          </a:p>
-          <a:p>
-            <a:pPr>
-              <a:buNone/>
-            </a:pPr>
-            <a:r>
-              <a:rPr lang="en-US" altLang="ko-KR" sz="1600" dirty="0" smtClean="0">
-                <a:latin typeface="Consolas" pitchFamily="49" charset="0"/>
-                <a:cs typeface="Consolas" pitchFamily="49" charset="0"/>
-              </a:rPr>
-              <a:t>      left </a:t>
-            </a:r>
-            <a:r>
-              <a:rPr lang="en-US" altLang="ko-KR" sz="1600" dirty="0" smtClean="0">
-                <a:latin typeface="Consolas" pitchFamily="49" charset="0"/>
-                <a:cs typeface="Consolas" pitchFamily="49" charset="0"/>
-              </a:rPr>
-              <a:t>/= </a:t>
-            </a:r>
-            <a:r>
-              <a:rPr lang="en-US" altLang="ko-KR" sz="1600" b="1" dirty="0" smtClean="0">
-                <a:latin typeface="Consolas" pitchFamily="49" charset="0"/>
-                <a:cs typeface="Consolas" pitchFamily="49" charset="0"/>
-              </a:rPr>
-              <a:t>primary</a:t>
-            </a:r>
-            <a:r>
-              <a:rPr lang="en-US" altLang="ko-KR" sz="1600" dirty="0" smtClean="0">
-                <a:latin typeface="Consolas" pitchFamily="49" charset="0"/>
-                <a:cs typeface="Consolas" pitchFamily="49" charset="0"/>
-              </a:rPr>
-              <a:t>();</a:t>
-            </a:r>
-            <a:endParaRPr lang="en-US" altLang="ko-KR" sz="1600" dirty="0" smtClean="0">
-              <a:latin typeface="Consolas" pitchFamily="49" charset="0"/>
-              <a:cs typeface="Consolas" pitchFamily="49" charset="0"/>
-            </a:endParaRPr>
           </a:p>
           <a:p>
             <a:pPr>
@@ -15592,13 +15525,8 @@
           <a:p>
             <a:r>
               <a:rPr lang="en-US" altLang="ko-KR" sz="2400" dirty="0" smtClean="0"/>
-              <a:t> </a:t>
-            </a:r>
-            <a:r>
-              <a:rPr lang="en-US" altLang="ko-KR" sz="2400" dirty="0" smtClean="0"/>
-              <a:t> Primary ((‘*’|’/’) Primary)*</a:t>
-            </a:r>
-            <a:endParaRPr lang="en-US" altLang="ko-KR" sz="2400" dirty="0" smtClean="0"/>
+              <a:t>  Primary ((‘*’|’/’) Primary)*</a:t>
+            </a:r>
           </a:p>
         </p:txBody>
       </p:sp>
@@ -17356,90 +17284,55 @@
                 <a:latin typeface="Consolas" pitchFamily="49" charset="0"/>
                 <a:cs typeface="Consolas" pitchFamily="49" charset="0"/>
               </a:rPr>
-              <a:t> </a:t>
-            </a:r>
-            <a:r>
-              <a:rPr lang="en-US" altLang="ko-KR" dirty="0" smtClean="0">
-                <a:latin typeface="Consolas" pitchFamily="49" charset="0"/>
-                <a:cs typeface="Consolas" pitchFamily="49" charset="0"/>
-              </a:rPr>
-              <a:t> if (full) {</a:t>
-            </a:r>
-          </a:p>
-          <a:p>
-            <a:pPr>
-              <a:buNone/>
-            </a:pPr>
-            <a:r>
-              <a:rPr lang="en-US" altLang="ko-KR" dirty="0" smtClean="0">
-                <a:latin typeface="Consolas" pitchFamily="49" charset="0"/>
-                <a:cs typeface="Consolas" pitchFamily="49" charset="0"/>
-              </a:rPr>
-              <a:t> </a:t>
-            </a:r>
-            <a:r>
-              <a:rPr lang="en-US" altLang="ko-KR" dirty="0" smtClean="0">
-                <a:latin typeface="Consolas" pitchFamily="49" charset="0"/>
-                <a:cs typeface="Consolas" pitchFamily="49" charset="0"/>
-              </a:rPr>
-              <a:t>   full = false;</a:t>
-            </a:r>
-          </a:p>
-          <a:p>
-            <a:pPr>
-              <a:buNone/>
-            </a:pPr>
-            <a:r>
-              <a:rPr lang="en-US" altLang="ko-KR" dirty="0" smtClean="0">
-                <a:latin typeface="Consolas" pitchFamily="49" charset="0"/>
-                <a:cs typeface="Consolas" pitchFamily="49" charset="0"/>
-              </a:rPr>
-              <a:t> </a:t>
-            </a:r>
-            <a:r>
-              <a:rPr lang="en-US" altLang="ko-KR" dirty="0" smtClean="0">
-                <a:latin typeface="Consolas" pitchFamily="49" charset="0"/>
-                <a:cs typeface="Consolas" pitchFamily="49" charset="0"/>
-              </a:rPr>
-              <a:t>   return buffer;</a:t>
-            </a:r>
-          </a:p>
-          <a:p>
-            <a:pPr>
-              <a:buNone/>
-            </a:pPr>
-            <a:r>
-              <a:rPr lang="en-US" altLang="ko-KR" dirty="0" smtClean="0">
-                <a:latin typeface="Consolas" pitchFamily="49" charset="0"/>
-                <a:cs typeface="Consolas" pitchFamily="49" charset="0"/>
-              </a:rPr>
-              <a:t> </a:t>
-            </a:r>
-            <a:r>
-              <a:rPr lang="en-US" altLang="ko-KR" dirty="0" smtClean="0">
-                <a:latin typeface="Consolas" pitchFamily="49" charset="0"/>
-                <a:cs typeface="Consolas" pitchFamily="49" charset="0"/>
-              </a:rPr>
-              <a:t> }</a:t>
-            </a:r>
-          </a:p>
-          <a:p>
-            <a:pPr>
-              <a:buNone/>
-            </a:pPr>
-            <a:r>
-              <a:rPr lang="en-US" altLang="ko-KR" dirty="0" smtClean="0">
-                <a:latin typeface="Consolas" pitchFamily="49" charset="0"/>
-                <a:cs typeface="Consolas" pitchFamily="49" charset="0"/>
-              </a:rPr>
-              <a:t> </a:t>
-            </a:r>
-            <a:r>
-              <a:rPr lang="en-US" altLang="ko-KR" dirty="0" smtClean="0">
-                <a:latin typeface="Consolas" pitchFamily="49" charset="0"/>
-                <a:cs typeface="Consolas" pitchFamily="49" charset="0"/>
-              </a:rPr>
-              <a:t> return </a:t>
+              <a:t>  if (full) {</a:t>
+            </a:r>
+          </a:p>
+          <a:p>
+            <a:pPr>
+              <a:buNone/>
+            </a:pPr>
+            <a:r>
+              <a:rPr lang="en-US" altLang="ko-KR" dirty="0" smtClean="0">
+                <a:latin typeface="Consolas" pitchFamily="49" charset="0"/>
+                <a:cs typeface="Consolas" pitchFamily="49" charset="0"/>
+              </a:rPr>
+              <a:t>    full = false;</a:t>
+            </a:r>
+          </a:p>
+          <a:p>
+            <a:pPr>
+              <a:buNone/>
+            </a:pPr>
+            <a:r>
+              <a:rPr lang="en-US" altLang="ko-KR" dirty="0" smtClean="0">
+                <a:latin typeface="Consolas" pitchFamily="49" charset="0"/>
+                <a:cs typeface="Consolas" pitchFamily="49" charset="0"/>
+              </a:rPr>
+              <a:t>    return buffer;</a:t>
+            </a:r>
+          </a:p>
+          <a:p>
+            <a:pPr>
+              <a:buNone/>
+            </a:pPr>
+            <a:r>
+              <a:rPr lang="en-US" altLang="ko-KR" dirty="0" smtClean="0">
+                <a:latin typeface="Consolas" pitchFamily="49" charset="0"/>
+                <a:cs typeface="Consolas" pitchFamily="49" charset="0"/>
+              </a:rPr>
+              <a:t>  }</a:t>
+            </a:r>
+          </a:p>
+          <a:p>
+            <a:pPr>
+              <a:buNone/>
+            </a:pPr>
+            <a:r>
+              <a:rPr lang="en-US" altLang="ko-KR" dirty="0" smtClean="0">
+                <a:latin typeface="Consolas" pitchFamily="49" charset="0"/>
+                <a:cs typeface="Consolas" pitchFamily="49" charset="0"/>
+              </a:rPr>
+              <a:t>  return </a:t>
             </a:r>
             <a:r>
               <a:rPr lang="en-US" altLang="ko-KR" dirty="0" err="1" smtClean="0">
@@ -17455,6 +17348,23 @@
               </a:rPr>
               <a:t>();</a:t>
             </a:r>
+          </a:p>
+          <a:p>
+            <a:pPr>
+              <a:buNone/>
+            </a:pPr>
+            <a:r>
+              <a:rPr lang="en-US" altLang="ko-KR" dirty="0" smtClean="0">
+                <a:latin typeface="Consolas" pitchFamily="49" charset="0"/>
+                <a:cs typeface="Consolas" pitchFamily="49" charset="0"/>
+              </a:rPr>
+              <a:t>}</a:t>
+            </a:r>
+          </a:p>
+          <a:p>
+            <a:pPr>
+              <a:buNone/>
+            </a:pPr>
             <a:endParaRPr lang="en-US" altLang="ko-KR" dirty="0" smtClean="0">
               <a:latin typeface="Consolas" pitchFamily="49" charset="0"/>
               <a:cs typeface="Consolas" pitchFamily="49" charset="0"/>
@@ -17469,27 +17379,6 @@
                 <a:latin typeface="Consolas" pitchFamily="49" charset="0"/>
                 <a:cs typeface="Consolas" pitchFamily="49" charset="0"/>
               </a:rPr>
-              <a:t>}</a:t>
-            </a:r>
-          </a:p>
-          <a:p>
-            <a:pPr>
-              <a:buNone/>
-            </a:pPr>
-            <a:endParaRPr lang="en-US" altLang="ko-KR" dirty="0" smtClean="0">
-              <a:latin typeface="Consolas" pitchFamily="49" charset="0"/>
-              <a:cs typeface="Consolas" pitchFamily="49" charset="0"/>
-            </a:endParaRPr>
-          </a:p>
-          <a:p>
-            <a:pPr>
-              <a:buNone/>
-            </a:pPr>
-            <a:r>
-              <a:rPr lang="en-US" altLang="ko-KR" dirty="0" smtClean="0">
-                <a:latin typeface="Consolas" pitchFamily="49" charset="0"/>
-                <a:cs typeface="Consolas" pitchFamily="49" charset="0"/>
-              </a:rPr>
               <a:t>void </a:t>
             </a:r>
             <a:r>
@@ -17530,14 +17419,7 @@
                 <a:latin typeface="Consolas" pitchFamily="49" charset="0"/>
                 <a:cs typeface="Consolas" pitchFamily="49" charset="0"/>
               </a:rPr>
-              <a:t> </a:t>
-            </a:r>
-            <a:r>
-              <a:rPr lang="en-US" altLang="ko-KR" dirty="0" smtClean="0">
-                <a:latin typeface="Consolas" pitchFamily="49" charset="0"/>
-                <a:cs typeface="Consolas" pitchFamily="49" charset="0"/>
-              </a:rPr>
-              <a:t> if (full) error(“Can’t </a:t>
+              <a:t>  if (full) error(“Can’t </a:t>
             </a:r>
             <a:r>
               <a:rPr lang="en-US" altLang="ko-KR" dirty="0" err="1" smtClean="0">
@@ -17563,33 +17445,19 @@
                 <a:latin typeface="Consolas" pitchFamily="49" charset="0"/>
                 <a:cs typeface="Consolas" pitchFamily="49" charset="0"/>
               </a:rPr>
-              <a:t> </a:t>
-            </a:r>
-            <a:r>
-              <a:rPr lang="en-US" altLang="ko-KR" dirty="0" smtClean="0">
-                <a:latin typeface="Consolas" pitchFamily="49" charset="0"/>
-                <a:cs typeface="Consolas" pitchFamily="49" charset="0"/>
-              </a:rPr>
-              <a:t> full = true;</a:t>
-            </a:r>
-          </a:p>
-          <a:p>
-            <a:pPr>
-              <a:buNone/>
-            </a:pPr>
-            <a:r>
-              <a:rPr lang="en-US" altLang="ko-KR" dirty="0" smtClean="0">
-                <a:latin typeface="Consolas" pitchFamily="49" charset="0"/>
-                <a:cs typeface="Consolas" pitchFamily="49" charset="0"/>
-              </a:rPr>
-              <a:t> </a:t>
-            </a:r>
-            <a:r>
-              <a:rPr lang="en-US" altLang="ko-KR" dirty="0" smtClean="0">
-                <a:latin typeface="Consolas" pitchFamily="49" charset="0"/>
-                <a:cs typeface="Consolas" pitchFamily="49" charset="0"/>
-              </a:rPr>
-              <a:t> buffer = t;</a:t>
+              <a:t>  full = true;</a:t>
+            </a:r>
+          </a:p>
+          <a:p>
+            <a:pPr>
+              <a:buNone/>
+            </a:pPr>
+            <a:r>
+              <a:rPr lang="en-US" altLang="ko-KR" dirty="0" smtClean="0">
+                <a:latin typeface="Consolas" pitchFamily="49" charset="0"/>
+                <a:cs typeface="Consolas" pitchFamily="49" charset="0"/>
+              </a:rPr>
+              <a:t>  buffer = t;</a:t>
             </a:r>
           </a:p>
           <a:p>
@@ -17829,11 +17697,7 @@
           <a:p>
             <a:r>
               <a:rPr lang="ko-KR" altLang="en-US" dirty="0" smtClean="0"/>
-              <a:t>계산기 </a:t>
-            </a:r>
-            <a:r>
-              <a:rPr lang="ko-KR" altLang="en-US" dirty="0" smtClean="0"/>
-              <a:t>골격</a:t>
+              <a:t>계산기 골격</a:t>
             </a:r>
             <a:endParaRPr lang="ko-KR" altLang="en-US" dirty="0"/>
           </a:p>
@@ -17877,11 +17741,7 @@
             </a:pPr>
             <a:r>
               <a:rPr lang="en-US" altLang="ko-KR" dirty="0" smtClean="0"/>
-              <a:t>Write </a:t>
-            </a:r>
-            <a:r>
-              <a:rPr lang="en-US" altLang="ko-KR" dirty="0" smtClean="0"/>
-              <a:t>result</a:t>
+              <a:t>Write result</a:t>
             </a:r>
           </a:p>
           <a:p>
@@ -18016,11 +17876,7 @@
             </a:pPr>
             <a:r>
               <a:rPr lang="en-US" altLang="ko-KR" dirty="0" smtClean="0"/>
-              <a:t>	</a:t>
-            </a:r>
-            <a:r>
-              <a:rPr lang="en-US" altLang="ko-KR" dirty="0" smtClean="0"/>
-              <a:t>Expression</a:t>
+              <a:t>	Expression</a:t>
             </a:r>
           </a:p>
           <a:p>
@@ -18076,11 +17932,7 @@
             </a:r>
             <a:r>
               <a:rPr lang="en-US" altLang="ko-KR" dirty="0" smtClean="0"/>
-              <a:t> </a:t>
-            </a:r>
-            <a:r>
-              <a:rPr lang="en-US" altLang="ko-KR" dirty="0" smtClean="0"/>
-              <a:t>Expression</a:t>
+              <a:t> Expression</a:t>
             </a:r>
           </a:p>
           <a:p>
@@ -18112,24 +17964,16 @@
             </a:pPr>
             <a:r>
               <a:rPr lang="en-US" altLang="ko-KR" dirty="0" smtClean="0"/>
-              <a:t> </a:t>
-            </a:r>
-            <a:r>
-              <a:rPr lang="en-US" altLang="ko-KR" dirty="0" smtClean="0"/>
-              <a:t> Number</a:t>
-            </a:r>
-          </a:p>
-          <a:p>
-            <a:pPr>
-              <a:buNone/>
-            </a:pPr>
-            <a:r>
-              <a:rPr lang="en-US" altLang="ko-KR" dirty="0" smtClean="0"/>
-              <a:t> </a:t>
-            </a:r>
-            <a:r>
-              <a:rPr lang="en-US" altLang="ko-KR" dirty="0" smtClean="0"/>
-              <a:t> </a:t>
+              <a:t>  Number</a:t>
+            </a:r>
+          </a:p>
+          <a:p>
+            <a:pPr>
+              <a:buNone/>
+            </a:pPr>
+            <a:r>
+              <a:rPr lang="en-US" altLang="ko-KR" dirty="0" smtClean="0"/>
+              <a:t>  </a:t>
             </a:r>
             <a:r>
               <a:rPr lang="en-US" altLang="ko-KR" dirty="0" smtClean="0">
@@ -18146,11 +17990,7 @@
             </a:pPr>
             <a:r>
               <a:rPr lang="en-US" altLang="ko-KR" dirty="0" smtClean="0"/>
-              <a:t> </a:t>
-            </a:r>
-            <a:r>
-              <a:rPr lang="en-US" altLang="ko-KR" dirty="0" smtClean="0"/>
-              <a:t> </a:t>
+              <a:t>  </a:t>
             </a:r>
             <a:r>
               <a:rPr lang="en-US" altLang="ko-KR" dirty="0" smtClean="0">
@@ -19146,10 +18986,6 @@
               </a:rPr>
               <a:t>() </a:t>
             </a:r>
-            <a:endParaRPr lang="en-US" altLang="ko-KR" sz="2400" dirty="0" smtClean="0">
-              <a:latin typeface="Consolas" pitchFamily="49" charset="0"/>
-              <a:cs typeface="Consolas" pitchFamily="49" charset="0"/>
-            </a:endParaRPr>
           </a:p>
           <a:p>
             <a:pPr>
@@ -19172,27 +19008,98 @@
                 <a:latin typeface="Consolas" pitchFamily="49" charset="0"/>
                 <a:cs typeface="Consolas" pitchFamily="49" charset="0"/>
               </a:rPr>
-              <a:t>  Token </a:t>
+              <a:t>  Token t = </a:t>
+            </a:r>
+            <a:r>
+              <a:rPr lang="en-US" altLang="ko-KR" sz="2400" b="1" dirty="0" err="1" smtClean="0">
+                <a:latin typeface="Consolas" pitchFamily="49" charset="0"/>
+                <a:cs typeface="Consolas" pitchFamily="49" charset="0"/>
+              </a:rPr>
+              <a:t>ts.get</a:t>
             </a:r>
             <a:r>
               <a:rPr lang="en-US" altLang="ko-KR" sz="2400" dirty="0" smtClean="0">
                 <a:latin typeface="Consolas" pitchFamily="49" charset="0"/>
                 <a:cs typeface="Consolas" pitchFamily="49" charset="0"/>
               </a:rPr>
-              <a:t>t = </a:t>
+              <a:t>();</a:t>
+            </a:r>
+          </a:p>
+          <a:p>
+            <a:pPr>
+              <a:buNone/>
+            </a:pPr>
+            <a:r>
+              <a:rPr lang="en-US" altLang="ko-KR" sz="2400" dirty="0" smtClean="0">
+                <a:latin typeface="Consolas" pitchFamily="49" charset="0"/>
+                <a:cs typeface="Consolas" pitchFamily="49" charset="0"/>
+              </a:rPr>
+              <a:t>  if (</a:t>
+            </a:r>
+            <a:r>
+              <a:rPr lang="en-US" altLang="ko-KR" sz="2400" dirty="0" err="1" smtClean="0">
+                <a:latin typeface="Consolas" pitchFamily="49" charset="0"/>
+                <a:cs typeface="Consolas" pitchFamily="49" charset="0"/>
+              </a:rPr>
+              <a:t>t.kind</a:t>
+            </a:r>
+            <a:r>
+              <a:rPr lang="en-US" altLang="ko-KR" sz="2400" dirty="0" smtClean="0">
+                <a:latin typeface="Consolas" pitchFamily="49" charset="0"/>
+                <a:cs typeface="Consolas" pitchFamily="49" charset="0"/>
+              </a:rPr>
+              <a:t> != name) error(“...”);</a:t>
+            </a:r>
+          </a:p>
+          <a:p>
+            <a:pPr>
+              <a:buNone/>
+            </a:pPr>
+            <a:r>
+              <a:rPr lang="en-US" altLang="ko-KR" sz="2400" dirty="0" smtClean="0">
+                <a:latin typeface="Consolas" pitchFamily="49" charset="0"/>
+                <a:cs typeface="Consolas" pitchFamily="49" charset="0"/>
+              </a:rPr>
+              <a:t>  if (</a:t>
             </a:r>
             <a:r>
               <a:rPr lang="en-US" altLang="ko-KR" sz="2400" b="1" dirty="0" err="1" smtClean="0">
                 <a:latin typeface="Consolas" pitchFamily="49" charset="0"/>
                 <a:cs typeface="Consolas" pitchFamily="49" charset="0"/>
               </a:rPr>
-              <a:t>ts.get</a:t>
+              <a:t>is_defined</a:t>
             </a:r>
             <a:r>
               <a:rPr lang="en-US" altLang="ko-KR" sz="2400" dirty="0" smtClean="0">
                 <a:latin typeface="Consolas" pitchFamily="49" charset="0"/>
                 <a:cs typeface="Consolas" pitchFamily="49" charset="0"/>
               </a:rPr>
+              <a:t>(t.name)) error(“...”);</a:t>
+            </a:r>
+          </a:p>
+          <a:p>
+            <a:pPr>
+              <a:buNone/>
+            </a:pPr>
+            <a:r>
+              <a:rPr lang="en-US" altLang="ko-KR" sz="2400" dirty="0" smtClean="0">
+                <a:latin typeface="Consolas" pitchFamily="49" charset="0"/>
+                <a:cs typeface="Consolas" pitchFamily="49" charset="0"/>
+              </a:rPr>
+              <a:t>  double v = </a:t>
+            </a:r>
+            <a:r>
+              <a:rPr lang="en-US" altLang="ko-KR" sz="2400" b="1" dirty="0" smtClean="0">
+                <a:latin typeface="Consolas" pitchFamily="49" charset="0"/>
+                <a:cs typeface="Consolas" pitchFamily="49" charset="0"/>
+              </a:rPr>
+              <a:t>expression</a:t>
+            </a:r>
+            <a:r>
+              <a:rPr lang="en-US" altLang="ko-KR" sz="2400" dirty="0" smtClean="0">
+                <a:latin typeface="Consolas" pitchFamily="49" charset="0"/>
+                <a:cs typeface="Consolas" pitchFamily="49" charset="0"/>
+              </a:rPr>
               <a:t>();</a:t>
             </a:r>
           </a:p>
@@ -19205,143 +19112,33 @@
                 <a:latin typeface="Consolas" pitchFamily="49" charset="0"/>
                 <a:cs typeface="Consolas" pitchFamily="49" charset="0"/>
               </a:rPr>
-              <a:t> </a:t>
+              <a:t>  </a:t>
+            </a:r>
+            <a:r>
+              <a:rPr lang="en-US" altLang="ko-KR" sz="2400" b="1" dirty="0" err="1" smtClean="0">
+                <a:latin typeface="Consolas" pitchFamily="49" charset="0"/>
+                <a:cs typeface="Consolas" pitchFamily="49" charset="0"/>
+              </a:rPr>
+              <a:t>define_variable</a:t>
             </a:r>
             <a:r>
               <a:rPr lang="en-US" altLang="ko-KR" sz="2400" dirty="0" smtClean="0">
                 <a:latin typeface="Consolas" pitchFamily="49" charset="0"/>
                 <a:cs typeface="Consolas" pitchFamily="49" charset="0"/>
               </a:rPr>
-              <a:t> if (</a:t>
-            </a:r>
-            <a:r>
-              <a:rPr lang="en-US" altLang="ko-KR" sz="2400" dirty="0" err="1" smtClean="0">
-                <a:latin typeface="Consolas" pitchFamily="49" charset="0"/>
-                <a:cs typeface="Consolas" pitchFamily="49" charset="0"/>
-              </a:rPr>
-              <a:t>t.kind</a:t>
-            </a:r>
+              <a:t>(t.name, v);</a:t>
+            </a:r>
+          </a:p>
+          <a:p>
+            <a:pPr>
+              <a:buNone/>
+            </a:pPr>
             <a:r>
               <a:rPr lang="en-US" altLang="ko-KR" sz="2400" dirty="0" smtClean="0">
                 <a:latin typeface="Consolas" pitchFamily="49" charset="0"/>
                 <a:cs typeface="Consolas" pitchFamily="49" charset="0"/>
               </a:rPr>
-              <a:t> != name) error(“...”);</a:t>
-            </a:r>
-          </a:p>
-          <a:p>
-            <a:pPr>
-              <a:buNone/>
-            </a:pPr>
-            <a:r>
-              <a:rPr lang="en-US" altLang="ko-KR" sz="2400" dirty="0" smtClean="0">
-                <a:latin typeface="Consolas" pitchFamily="49" charset="0"/>
-                <a:cs typeface="Consolas" pitchFamily="49" charset="0"/>
-              </a:rPr>
-              <a:t> </a:t>
-            </a:r>
-            <a:r>
-              <a:rPr lang="en-US" altLang="ko-KR" sz="2400" dirty="0" smtClean="0">
-                <a:latin typeface="Consolas" pitchFamily="49" charset="0"/>
-                <a:cs typeface="Consolas" pitchFamily="49" charset="0"/>
-              </a:rPr>
-              <a:t> if (</a:t>
-            </a:r>
-            <a:r>
-              <a:rPr lang="en-US" altLang="ko-KR" sz="2400" b="1" dirty="0" err="1" smtClean="0">
-                <a:latin typeface="Consolas" pitchFamily="49" charset="0"/>
-                <a:cs typeface="Consolas" pitchFamily="49" charset="0"/>
-              </a:rPr>
-              <a:t>is_defined</a:t>
-            </a:r>
-            <a:r>
-              <a:rPr lang="en-US" altLang="ko-KR" sz="2400" dirty="0" smtClean="0">
-                <a:latin typeface="Consolas" pitchFamily="49" charset="0"/>
-                <a:cs typeface="Consolas" pitchFamily="49" charset="0"/>
-              </a:rPr>
-              <a:t>(t.name)) error(“...”);</a:t>
-            </a:r>
-            <a:endParaRPr lang="en-US" altLang="ko-KR" sz="2400" dirty="0" smtClean="0">
-              <a:latin typeface="Consolas" pitchFamily="49" charset="0"/>
-              <a:cs typeface="Consolas" pitchFamily="49" charset="0"/>
-            </a:endParaRPr>
-          </a:p>
-          <a:p>
-            <a:pPr>
-              <a:buNone/>
-            </a:pPr>
-            <a:r>
-              <a:rPr lang="en-US" altLang="ko-KR" sz="2400" dirty="0" smtClean="0">
-                <a:latin typeface="Consolas" pitchFamily="49" charset="0"/>
-                <a:cs typeface="Consolas" pitchFamily="49" charset="0"/>
-              </a:rPr>
-              <a:t>  double v = </a:t>
-            </a:r>
-            <a:r>
-              <a:rPr lang="en-US" altLang="ko-KR" sz="2400" b="1" dirty="0" smtClean="0">
-                <a:latin typeface="Consolas" pitchFamily="49" charset="0"/>
-                <a:cs typeface="Consolas" pitchFamily="49" charset="0"/>
-              </a:rPr>
-              <a:t>expression</a:t>
-            </a:r>
-            <a:r>
-              <a:rPr lang="en-US" altLang="ko-KR" sz="2400" dirty="0" smtClean="0">
-                <a:latin typeface="Consolas" pitchFamily="49" charset="0"/>
-                <a:cs typeface="Consolas" pitchFamily="49" charset="0"/>
-              </a:rPr>
-              <a:t>();</a:t>
-            </a:r>
-          </a:p>
-          <a:p>
-            <a:pPr>
-              <a:buNone/>
-            </a:pPr>
-            <a:r>
-              <a:rPr lang="en-US" altLang="ko-KR" sz="2400" dirty="0" smtClean="0">
-                <a:latin typeface="Consolas" pitchFamily="49" charset="0"/>
-                <a:cs typeface="Consolas" pitchFamily="49" charset="0"/>
-              </a:rPr>
-              <a:t> </a:t>
-            </a:r>
-            <a:r>
-              <a:rPr lang="en-US" altLang="ko-KR" sz="2400" dirty="0" smtClean="0">
-                <a:latin typeface="Consolas" pitchFamily="49" charset="0"/>
-                <a:cs typeface="Consolas" pitchFamily="49" charset="0"/>
-              </a:rPr>
-              <a:t> </a:t>
-            </a:r>
-            <a:r>
-              <a:rPr lang="en-US" altLang="ko-KR" sz="2400" b="1" dirty="0" err="1" smtClean="0">
-                <a:latin typeface="Consolas" pitchFamily="49" charset="0"/>
-                <a:cs typeface="Consolas" pitchFamily="49" charset="0"/>
-              </a:rPr>
-              <a:t>define_variable</a:t>
-            </a:r>
-            <a:r>
-              <a:rPr lang="en-US" altLang="ko-KR" sz="2400" dirty="0" smtClean="0">
-                <a:latin typeface="Consolas" pitchFamily="49" charset="0"/>
-                <a:cs typeface="Consolas" pitchFamily="49" charset="0"/>
-              </a:rPr>
-              <a:t>(t.name, v);</a:t>
-            </a:r>
-          </a:p>
-          <a:p>
-            <a:pPr>
-              <a:buNone/>
-            </a:pPr>
-            <a:r>
-              <a:rPr lang="en-US" altLang="ko-KR" sz="2400" dirty="0" smtClean="0">
-                <a:latin typeface="Consolas" pitchFamily="49" charset="0"/>
-                <a:cs typeface="Consolas" pitchFamily="49" charset="0"/>
-              </a:rPr>
-              <a:t> </a:t>
-            </a:r>
-            <a:r>
-              <a:rPr lang="en-US" altLang="ko-KR" sz="2400" dirty="0" smtClean="0">
-                <a:latin typeface="Consolas" pitchFamily="49" charset="0"/>
-                <a:cs typeface="Consolas" pitchFamily="49" charset="0"/>
-              </a:rPr>
-              <a:t> return v;</a:t>
+              <a:t>  return v;</a:t>
             </a:r>
           </a:p>
           <a:p>
@@ -19391,11 +19188,7 @@
           <a:p>
             <a:r>
               <a:rPr lang="en-US" altLang="ko-KR" sz="2400" b="1" dirty="0" smtClean="0"/>
-              <a:t>Declaration</a:t>
-            </a:r>
-            <a:r>
-              <a:rPr lang="en-US" altLang="ko-KR" sz="2400" b="1" dirty="0" smtClean="0"/>
-              <a:t>:</a:t>
+              <a:t>Declaration:</a:t>
             </a:r>
           </a:p>
           <a:p>
@@ -20104,11 +19897,7 @@
             <a:pPr lvl="1"/>
             <a:r>
               <a:rPr lang="ko-KR" altLang="en-US" dirty="0" smtClean="0"/>
-              <a:t>문법 잘 </a:t>
-            </a:r>
-            <a:r>
-              <a:rPr lang="ko-KR" altLang="en-US" dirty="0" smtClean="0"/>
-              <a:t>정의하기</a:t>
+              <a:t>문법 잘 정의하기</a:t>
             </a:r>
             <a:endParaRPr lang="en-US" altLang="ko-KR" dirty="0" smtClean="0"/>
           </a:p>
@@ -20138,97 +19927,6 @@
       </p:par>
     </p:tnLst>
   </p:timing>
-</p:sld>
-</file>
-
-<file path=ppt/slides/slide36.xml><?xml version="1.0" encoding="utf-8"?>
-<p:sld xmlns:a="http://schemas.openxmlformats.org/drawingml/2006/main" xmlns:r="http://schemas.openxmlformats.org/officeDocument/2006/relationships" xmlns:p="http://schemas.openxmlformats.org/presentationml/2006/main">
-  <p:cSld>
-    <p:spTree>
-      <p:nvGrpSpPr>
-        <p:cNvPr id="1" name=""/>
-        <p:cNvGrpSpPr/>
-        <p:nvPr/>
-      </p:nvGrpSpPr>
-      <p:grpSpPr>
-        <a:xfrm>
-          <a:off x="0" y="0"/>
-          <a:ext cx="0" cy="0"/>
-          <a:chOff x="0" y="0"/>
-          <a:chExt cx="0" cy="0"/>
-        </a:xfrm>
-      </p:grpSpPr>
-      <p:sp>
-        <p:nvSpPr>
-          <p:cNvPr id="2" name="제목 1"/>
-          <p:cNvSpPr>
-            <a:spLocks noGrp="1"/>
-          </p:cNvSpPr>
-          <p:nvPr>
-            <p:ph type="title"/>
-          </p:nvPr>
-        </p:nvSpPr>
-        <p:spPr/>
-        <p:txBody>
-          <a:bodyPr/>
-          <a:lstStyle/>
-          <a:p>
-            <a:r>
-              <a:rPr lang="en-US" altLang="ko-KR" dirty="0" smtClean="0"/>
-              <a:t>Parse tree </a:t>
-            </a:r>
-            <a:r>
-              <a:rPr lang="ko-KR" altLang="en-US" dirty="0" smtClean="0"/>
-              <a:t>만들기 힌트</a:t>
-            </a:r>
-            <a:endParaRPr lang="ko-KR" altLang="en-US" dirty="0"/>
-          </a:p>
-        </p:txBody>
-      </p:sp>
-      <p:sp>
-        <p:nvSpPr>
-          <p:cNvPr id="3" name="내용 개체 틀 2"/>
-          <p:cNvSpPr>
-            <a:spLocks noGrp="1"/>
-          </p:cNvSpPr>
-          <p:nvPr>
-            <p:ph idx="1"/>
-          </p:nvPr>
-        </p:nvSpPr>
-        <p:spPr/>
-        <p:txBody>
-          <a:bodyPr/>
-          <a:lstStyle/>
-          <a:p>
-            <a:pPr>
-              <a:buNone/>
-            </a:pPr>
-            <a:r>
-              <a:rPr lang="en-US" altLang="ko-KR" dirty="0" err="1" smtClean="0"/>
-              <a:t>struct</a:t>
-            </a:r>
-            <a:r>
-              <a:rPr lang="en-US" altLang="ko-KR" dirty="0" smtClean="0"/>
-              <a:t> Node {</a:t>
-            </a:r>
-          </a:p>
-          <a:p>
-            <a:pPr>
-              <a:buNone/>
-            </a:pPr>
-            <a:r>
-              <a:rPr lang="en-US" altLang="ko-KR" smtClean="0"/>
-              <a:t>	...    </a:t>
-            </a:r>
-            <a:endParaRPr lang="en-US" altLang="ko-KR" dirty="0" smtClean="0"/>
-          </a:p>
-        </p:txBody>
-      </p:sp>
-    </p:spTree>
-  </p:cSld>
-  <p:clrMapOvr>
-    <a:masterClrMapping/>
-  </p:clrMapOvr>
 </p:sld>
 </file>
 
@@ -20392,17 +20090,7 @@
                 <a:latin typeface="Consolas" pitchFamily="49" charset="0"/>
                 <a:cs typeface="Consolas" pitchFamily="49" charset="0"/>
               </a:rPr>
-              <a:t>. 2+3): </a:t>
-            </a:r>
-            <a:r>
-              <a:rPr lang="en-US" altLang="ko-KR" dirty="0" smtClean="0">
-                <a:solidFill>
-                  <a:schemeClr val="accent2"/>
-                </a:solidFill>
-                <a:latin typeface="Consolas" pitchFamily="49" charset="0"/>
-                <a:cs typeface="Consolas" pitchFamily="49" charset="0"/>
-              </a:rPr>
-              <a:t>”</a:t>
+              <a:t>. 2+3): ”</a:t>
             </a:r>
             <a:r>
               <a:rPr lang="en-US" altLang="ko-KR" dirty="0" smtClean="0">
@@ -21237,11 +20925,7 @@
           <a:p>
             <a:r>
               <a:rPr lang="ko-KR" altLang="en-US" dirty="0" smtClean="0"/>
-              <a:t>고</a:t>
-            </a:r>
-            <a:r>
-              <a:rPr lang="ko-KR" altLang="en-US" dirty="0" smtClean="0"/>
-              <a:t>민</a:t>
+              <a:t>고민</a:t>
             </a:r>
             <a:endParaRPr lang="ko-KR" altLang="en-US" dirty="0"/>
           </a:p>
@@ -21470,11 +21154,7 @@
           <a:p>
             <a:r>
               <a:rPr lang="ko-KR" altLang="en-US" dirty="0" smtClean="0"/>
-              <a:t>토큰</a:t>
-            </a:r>
-            <a:r>
-              <a:rPr lang="ko-KR" altLang="en-US" dirty="0" smtClean="0"/>
-              <a:t>화</a:t>
+              <a:t>토큰화</a:t>
             </a:r>
             <a:endParaRPr lang="ko-KR" altLang="en-US" dirty="0"/>
           </a:p>

</xml_diff>